<commit_message>
Atualizações Finais para a apresentação
Atualizações Finais para a apresentação
</commit_message>
<xml_diff>
--- a/documents/life_cycle/Apresentação_Big_Data.pptx
+++ b/documents/life_cycle/Apresentação_Big_Data.pptx
@@ -255,7 +255,7 @@
               <a:pPr>
                 <a:defRPr/>
               </a:pPr>
-              <a:t>18/05/2015</a:t>
+              <a:t>19/05/2015</a:t>
             </a:fld>
             <a:endParaRPr lang="pt-BR"/>
           </a:p>
@@ -449,7 +449,7 @@
               <a:pPr>
                 <a:defRPr/>
               </a:pPr>
-              <a:t>18/05/2015</a:t>
+              <a:t>19/05/2015</a:t>
             </a:fld>
             <a:endParaRPr lang="pt-BR"/>
           </a:p>
@@ -2617,7 +2617,7 @@
               <a:pPr>
                 <a:defRPr/>
               </a:pPr>
-              <a:t>18/05/2015</a:t>
+              <a:t>19/05/2015</a:t>
             </a:fld>
             <a:endParaRPr lang="pt-BR"/>
           </a:p>
@@ -2814,7 +2814,7 @@
               <a:pPr>
                 <a:defRPr/>
               </a:pPr>
-              <a:t>18/05/2015</a:t>
+              <a:t>19/05/2015</a:t>
             </a:fld>
             <a:endParaRPr lang="pt-BR"/>
           </a:p>
@@ -3117,7 +3117,7 @@
               <a:pPr>
                 <a:defRPr/>
               </a:pPr>
-              <a:t>18/05/2015</a:t>
+              <a:t>19/05/2015</a:t>
             </a:fld>
             <a:endParaRPr lang="pt-BR"/>
           </a:p>
@@ -3432,7 +3432,7 @@
               <a:pPr>
                 <a:defRPr/>
               </a:pPr>
-              <a:t>18/05/2015</a:t>
+              <a:t>19/05/2015</a:t>
             </a:fld>
             <a:endParaRPr lang="pt-BR"/>
           </a:p>
@@ -3881,7 +3881,7 @@
               <a:pPr>
                 <a:defRPr/>
               </a:pPr>
-              <a:t>18/05/2015</a:t>
+              <a:t>19/05/2015</a:t>
             </a:fld>
             <a:endParaRPr lang="pt-BR"/>
           </a:p>
@@ -4026,7 +4026,7 @@
               <a:pPr>
                 <a:defRPr/>
               </a:pPr>
-              <a:t>18/05/2015</a:t>
+              <a:t>19/05/2015</a:t>
             </a:fld>
             <a:endParaRPr lang="pt-BR"/>
           </a:p>
@@ -4148,7 +4148,7 @@
               <a:pPr>
                 <a:defRPr/>
               </a:pPr>
-              <a:t>18/05/2015</a:t>
+              <a:t>19/05/2015</a:t>
             </a:fld>
             <a:endParaRPr lang="pt-BR"/>
           </a:p>
@@ -4452,7 +4452,7 @@
               <a:pPr>
                 <a:defRPr/>
               </a:pPr>
-              <a:t>18/05/2015</a:t>
+              <a:t>19/05/2015</a:t>
             </a:fld>
             <a:endParaRPr lang="pt-BR"/>
           </a:p>
@@ -4735,7 +4735,7 @@
               <a:pPr>
                 <a:defRPr/>
               </a:pPr>
-              <a:t>18/05/2015</a:t>
+              <a:t>19/05/2015</a:t>
             </a:fld>
             <a:endParaRPr lang="pt-BR"/>
           </a:p>
@@ -4932,7 +4932,7 @@
               <a:pPr>
                 <a:defRPr/>
               </a:pPr>
-              <a:t>18/05/2015</a:t>
+              <a:t>19/05/2015</a:t>
             </a:fld>
             <a:endParaRPr lang="pt-BR"/>
           </a:p>
@@ -5139,7 +5139,7 @@
               <a:pPr>
                 <a:defRPr/>
               </a:pPr>
-              <a:t>18/05/2015</a:t>
+              <a:t>19/05/2015</a:t>
             </a:fld>
             <a:endParaRPr lang="pt-BR"/>
           </a:p>
@@ -6761,7 +6761,7 @@
               <a:pPr>
                 <a:defRPr/>
               </a:pPr>
-              <a:t>18/05/2015</a:t>
+              <a:t>19/05/2015</a:t>
             </a:fld>
             <a:endParaRPr lang="pt-BR"/>
           </a:p>
@@ -13172,10 +13172,6 @@
               </a:rPr>
               <a:t>      https://github.com/sbanetosbk</a:t>
             </a:r>
-            <a:endParaRPr lang="pt-BR" sz="2000" kern="0" dirty="0">
-              <a:latin typeface="Arial" pitchFamily="34" charset="0"/>
-              <a:cs typeface="Arial" pitchFamily="34" charset="0"/>
-            </a:endParaRPr>
           </a:p>
         </p:txBody>
       </p:sp>
@@ -14467,7 +14463,6 @@
               <a:rPr lang="pt-BR" sz="1400" dirty="0"/>
               <a:t>5</a:t>
             </a:r>
-            <a:endParaRPr lang="pt-BR" sz="1400" dirty="0"/>
           </a:p>
         </p:txBody>
       </p:sp>
@@ -14643,10 +14638,6 @@
               </a:rPr>
               <a:t>Elaborado pelos autores.</a:t>
             </a:r>
-            <a:endParaRPr lang="pt-BR" sz="1200" kern="0" dirty="0" smtClean="0">
-              <a:latin typeface="Arial" pitchFamily="34" charset="0"/>
-              <a:cs typeface="Arial" pitchFamily="34" charset="0"/>
-            </a:endParaRPr>
           </a:p>
           <a:p>
             <a:pPr algn="just" eaLnBrk="0" hangingPunct="0">
@@ -14929,7 +14920,7 @@
         </p:blipFill>
         <p:spPr bwMode="auto">
           <a:xfrm>
-            <a:off x="1857221" y="2348880"/>
+            <a:off x="1857220" y="1205437"/>
             <a:ext cx="5622113" cy="1872208"/>
           </a:xfrm>
           <a:prstGeom prst="rect">
@@ -14970,7 +14961,7 @@
         </p:blipFill>
         <p:spPr bwMode="auto">
           <a:xfrm>
-            <a:off x="2422018" y="4365104"/>
+            <a:off x="2422018" y="4563806"/>
             <a:ext cx="4752528" cy="1731145"/>
           </a:xfrm>
           <a:prstGeom prst="rect">
@@ -15011,8 +15002,8 @@
         </p:blipFill>
         <p:spPr bwMode="auto">
           <a:xfrm>
-            <a:off x="2915816" y="923038"/>
-            <a:ext cx="3955355" cy="1977678"/>
+            <a:off x="2698448" y="2687493"/>
+            <a:ext cx="4199667" cy="2099834"/>
           </a:xfrm>
           <a:prstGeom prst="rect">
             <a:avLst/>
@@ -15199,7 +15190,6 @@
               <a:rPr lang="pt-BR" sz="1400" dirty="0"/>
               <a:t>8</a:t>
             </a:r>
-            <a:endParaRPr lang="pt-BR" sz="1400" dirty="0"/>
           </a:p>
         </p:txBody>
       </p:sp>
@@ -15434,28 +15424,7 @@
                 <a:latin typeface="Arial" pitchFamily="34" charset="0"/>
                 <a:cs typeface="Arial" pitchFamily="34" charset="0"/>
               </a:rPr>
-              <a:t>Pesquisa  </a:t>
-            </a:r>
-            <a:r>
-              <a:rPr lang="pt-BR" kern="0" dirty="0" smtClean="0">
-                <a:latin typeface="Arial" pitchFamily="34" charset="0"/>
-                <a:cs typeface="Arial" pitchFamily="34" charset="0"/>
-              </a:rPr>
-              <a:t>       </a:t>
-            </a:r>
-            <a:r>
-              <a:rPr lang="pt-BR" kern="0" dirty="0" smtClean="0">
-                <a:latin typeface="Arial" pitchFamily="34" charset="0"/>
-                <a:cs typeface="Arial" pitchFamily="34" charset="0"/>
-              </a:rPr>
-              <a:t>Público alvo              </a:t>
-            </a:r>
-            <a:r>
-              <a:rPr lang="pt-BR" kern="0" dirty="0" smtClean="0">
-                <a:latin typeface="Arial" pitchFamily="34" charset="0"/>
-                <a:cs typeface="Arial" pitchFamily="34" charset="0"/>
-              </a:rPr>
-              <a:t>Instrumentos</a:t>
+              <a:t>Pesquisa         Público alvo              Instrumentos</a:t>
             </a:r>
             <a:endParaRPr lang="pt-BR" kern="0" dirty="0">
               <a:latin typeface="Arial" pitchFamily="34" charset="0"/>
@@ -15522,7 +15491,6 @@
               <a:rPr lang="pt-BR" sz="1400" dirty="0"/>
               <a:t>9</a:t>
             </a:r>
-            <a:endParaRPr lang="pt-BR" sz="1400" dirty="0"/>
           </a:p>
         </p:txBody>
       </p:sp>

</xml_diff>

<commit_message>
Desenvolvimento do 1º protótipo de front-end
Desenvolvimento do 1º protótipo de front-end
</commit_message>
<xml_diff>
--- a/documents/life_cycle/Apresentação_Big_Data.pptx
+++ b/documents/life_cycle/Apresentação_Big_Data.pptx
@@ -1007,6 +1007,919 @@
         </p:txBody>
       </p:sp>
     </p:spTree>
+  </p:cSld>
+  <p:clrMapOvr>
+    <a:masterClrMapping/>
+  </p:clrMapOvr>
+</p:notes>
+</file>
+
+<file path=ppt/notesSlides/notesSlide2.xml><?xml version="1.0" encoding="utf-8"?>
+<p:notes xmlns:a="http://schemas.openxmlformats.org/drawingml/2006/main" xmlns:r="http://schemas.openxmlformats.org/officeDocument/2006/relationships" xmlns:p="http://schemas.openxmlformats.org/presentationml/2006/main">
+  <p:cSld>
+    <p:spTree>
+      <p:nvGrpSpPr>
+        <p:cNvPr id="1" name=""/>
+        <p:cNvGrpSpPr/>
+        <p:nvPr/>
+      </p:nvGrpSpPr>
+      <p:grpSpPr>
+        <a:xfrm>
+          <a:off x="0" y="0"/>
+          <a:ext cx="0" cy="0"/>
+          <a:chOff x="0" y="0"/>
+          <a:chExt cx="0" cy="0"/>
+        </a:xfrm>
+      </p:grpSpPr>
+      <p:sp>
+        <p:nvSpPr>
+          <p:cNvPr id="2" name="Espaço Reservado para Imagem de Slide 1"/>
+          <p:cNvSpPr>
+            <a:spLocks noGrp="1" noRot="1" noChangeAspect="1"/>
+          </p:cNvSpPr>
+          <p:nvPr>
+            <p:ph type="sldImg"/>
+          </p:nvPr>
+        </p:nvSpPr>
+        <p:spPr/>
+      </p:sp>
+      <p:sp>
+        <p:nvSpPr>
+          <p:cNvPr id="3" name="Espaço Reservado para Anotações 2"/>
+          <p:cNvSpPr>
+            <a:spLocks noGrp="1"/>
+          </p:cNvSpPr>
+          <p:nvPr>
+            <p:ph type="body" idx="1"/>
+          </p:nvPr>
+        </p:nvSpPr>
+        <p:spPr/>
+        <p:txBody>
+          <a:bodyPr/>
+          <a:lstStyle/>
+          <a:p>
+            <a:r>
+              <a:rPr lang="pt-BR" sz="1200" b="1" kern="1200" dirty="0" smtClean="0">
+                <a:solidFill>
+                  <a:schemeClr val="tx1"/>
+                </a:solidFill>
+                <a:effectLst/>
+                <a:latin typeface="+mn-lt"/>
+                <a:ea typeface="+mn-ea"/>
+                <a:cs typeface="+mn-cs"/>
+              </a:rPr>
+              <a:t>Fenômeno cultural, tecnológico e acadêmico que é formado da interação entre:</a:t>
+            </a:r>
+          </a:p>
+          <a:p>
+            <a:endParaRPr lang="pt-BR" sz="1200" b="1" kern="1200" dirty="0" smtClean="0">
+              <a:solidFill>
+                <a:schemeClr val="tx1"/>
+              </a:solidFill>
+              <a:effectLst/>
+              <a:latin typeface="+mn-lt"/>
+              <a:ea typeface="+mn-ea"/>
+              <a:cs typeface="+mn-cs"/>
+            </a:endParaRPr>
+          </a:p>
+          <a:p>
+            <a:r>
+              <a:rPr lang="pt-BR" sz="1200" b="1" kern="1200" dirty="0" smtClean="0">
+                <a:solidFill>
+                  <a:schemeClr val="tx1"/>
+                </a:solidFill>
+                <a:effectLst/>
+                <a:latin typeface="+mn-lt"/>
+                <a:ea typeface="+mn-ea"/>
+                <a:cs typeface="+mn-cs"/>
+              </a:rPr>
+              <a:t> tecnologia (capacidade computacional e precisão algorítmica para coletar, analisar, unir e comparar dados), </a:t>
+            </a:r>
+          </a:p>
+          <a:p>
+            <a:endParaRPr lang="pt-BR" sz="1200" b="1" kern="1200" dirty="0" smtClean="0">
+              <a:solidFill>
+                <a:schemeClr val="tx1"/>
+              </a:solidFill>
+              <a:effectLst/>
+              <a:latin typeface="+mn-lt"/>
+              <a:ea typeface="+mn-ea"/>
+              <a:cs typeface="+mn-cs"/>
+            </a:endParaRPr>
+          </a:p>
+          <a:p>
+            <a:r>
+              <a:rPr lang="pt-BR" sz="1200" b="1" kern="1200" dirty="0" smtClean="0">
+                <a:solidFill>
+                  <a:schemeClr val="tx1"/>
+                </a:solidFill>
+                <a:effectLst/>
+                <a:latin typeface="+mn-lt"/>
+                <a:ea typeface="+mn-ea"/>
+                <a:cs typeface="+mn-cs"/>
+              </a:rPr>
+              <a:t>análise (identificação padrões, a fim de fazer reivindicações econômicas, sociais, técnicas e legais) </a:t>
+            </a:r>
+          </a:p>
+          <a:p>
+            <a:r>
+              <a:rPr lang="pt-BR" sz="1200" b="1" kern="1200" dirty="0" smtClean="0">
+                <a:solidFill>
+                  <a:schemeClr val="tx1"/>
+                </a:solidFill>
+                <a:effectLst/>
+                <a:latin typeface="+mn-lt"/>
+                <a:ea typeface="+mn-ea"/>
+                <a:cs typeface="+mn-cs"/>
+              </a:rPr>
+              <a:t>e </a:t>
+            </a:r>
+          </a:p>
+          <a:p>
+            <a:r>
+              <a:rPr lang="pt-BR" sz="1200" b="1" kern="1200" dirty="0" smtClean="0">
+                <a:solidFill>
+                  <a:schemeClr val="tx1"/>
+                </a:solidFill>
+                <a:effectLst/>
+                <a:latin typeface="+mn-lt"/>
+                <a:ea typeface="+mn-ea"/>
+                <a:cs typeface="+mn-cs"/>
+              </a:rPr>
+              <a:t>mitologia (crença de que grandes conjuntos de dados oferecem uma forma mais elevada de inteligência e conhecimento que podem gerar perspectivas que antes eram impossíveis, com verdade, objetividade e precisão)</a:t>
+            </a:r>
+            <a:r>
+              <a:rPr lang="pt-BR" sz="1200" i="1" kern="1200" dirty="0" smtClean="0">
+                <a:solidFill>
+                  <a:schemeClr val="tx1"/>
+                </a:solidFill>
+                <a:effectLst/>
+                <a:latin typeface="+mn-lt"/>
+                <a:ea typeface="+mn-ea"/>
+                <a:cs typeface="+mn-cs"/>
+              </a:rPr>
+              <a:t> </a:t>
+            </a:r>
+            <a:endParaRPr lang="pt-BR" dirty="0"/>
+          </a:p>
+        </p:txBody>
+      </p:sp>
+      <p:sp>
+        <p:nvSpPr>
+          <p:cNvPr id="4" name="Espaço Reservado para Número de Slide 3"/>
+          <p:cNvSpPr>
+            <a:spLocks noGrp="1"/>
+          </p:cNvSpPr>
+          <p:nvPr>
+            <p:ph type="sldNum" sz="quarter" idx="10"/>
+          </p:nvPr>
+        </p:nvSpPr>
+        <p:spPr/>
+        <p:txBody>
+          <a:bodyPr/>
+          <a:lstStyle/>
+          <a:p>
+            <a:pPr>
+              <a:defRPr/>
+            </a:pPr>
+            <a:fld id="{668A7CBB-8257-47DA-A05C-7F8B3B29CA9C}" type="slidenum">
+              <a:rPr lang="pt-BR" smtClean="0"/>
+              <a:pPr>
+                <a:defRPr/>
+              </a:pPr>
+              <a:t>5</a:t>
+            </a:fld>
+            <a:endParaRPr lang="pt-BR"/>
+          </a:p>
+        </p:txBody>
+      </p:sp>
+    </p:spTree>
+    <p:extLst>
+      <p:ext uri="{BB962C8B-B14F-4D97-AF65-F5344CB8AC3E}">
+        <p14:creationId xmlns:p14="http://schemas.microsoft.com/office/powerpoint/2010/main" val="169321642"/>
+      </p:ext>
+    </p:extLst>
+  </p:cSld>
+  <p:clrMapOvr>
+    <a:masterClrMapping/>
+  </p:clrMapOvr>
+</p:notes>
+</file>
+
+<file path=ppt/notesSlides/notesSlide3.xml><?xml version="1.0" encoding="utf-8"?>
+<p:notes xmlns:a="http://schemas.openxmlformats.org/drawingml/2006/main" xmlns:r="http://schemas.openxmlformats.org/officeDocument/2006/relationships" xmlns:p="http://schemas.openxmlformats.org/presentationml/2006/main">
+  <p:cSld>
+    <p:spTree>
+      <p:nvGrpSpPr>
+        <p:cNvPr id="1" name=""/>
+        <p:cNvGrpSpPr/>
+        <p:nvPr/>
+      </p:nvGrpSpPr>
+      <p:grpSpPr>
+        <a:xfrm>
+          <a:off x="0" y="0"/>
+          <a:ext cx="0" cy="0"/>
+          <a:chOff x="0" y="0"/>
+          <a:chExt cx="0" cy="0"/>
+        </a:xfrm>
+      </p:grpSpPr>
+      <p:sp>
+        <p:nvSpPr>
+          <p:cNvPr id="2" name="Espaço Reservado para Imagem de Slide 1"/>
+          <p:cNvSpPr>
+            <a:spLocks noGrp="1" noRot="1" noChangeAspect="1"/>
+          </p:cNvSpPr>
+          <p:nvPr>
+            <p:ph type="sldImg"/>
+          </p:nvPr>
+        </p:nvSpPr>
+        <p:spPr/>
+      </p:sp>
+      <p:sp>
+        <p:nvSpPr>
+          <p:cNvPr id="3" name="Espaço Reservado para Anotações 2"/>
+          <p:cNvSpPr>
+            <a:spLocks noGrp="1"/>
+          </p:cNvSpPr>
+          <p:nvPr>
+            <p:ph type="body" idx="1"/>
+          </p:nvPr>
+        </p:nvSpPr>
+        <p:spPr/>
+        <p:txBody>
+          <a:bodyPr/>
+          <a:lstStyle/>
+          <a:p>
+            <a:pPr marL="0" marR="0" indent="0" algn="l" defTabSz="914400" rtl="0" eaLnBrk="0" fontAlgn="base" latinLnBrk="0" hangingPunct="0">
+              <a:lnSpc>
+                <a:spcPct val="100000"/>
+              </a:lnSpc>
+              <a:spcBef>
+                <a:spcPct val="30000"/>
+              </a:spcBef>
+              <a:spcAft>
+                <a:spcPct val="0"/>
+              </a:spcAft>
+              <a:buClrTx/>
+              <a:buSzTx/>
+              <a:buFontTx/>
+              <a:buNone/>
+              <a:tabLst/>
+              <a:defRPr/>
+            </a:pPr>
+            <a:r>
+              <a:rPr lang="pt-BR" sz="1200" kern="1200" dirty="0" smtClean="0">
+                <a:solidFill>
+                  <a:schemeClr val="tx1"/>
+                </a:solidFill>
+                <a:effectLst/>
+                <a:latin typeface="+mn-lt"/>
+                <a:ea typeface="+mn-ea"/>
+                <a:cs typeface="+mn-cs"/>
+              </a:rPr>
+              <a:t>Os sistemas Web desenvolvidos sobre plataforma .NET, Java, PHP, </a:t>
+            </a:r>
+            <a:r>
+              <a:rPr lang="pt-BR" sz="1200" kern="1200" dirty="0" err="1" smtClean="0">
+                <a:solidFill>
+                  <a:schemeClr val="tx1"/>
+                </a:solidFill>
+                <a:effectLst/>
+                <a:latin typeface="+mn-lt"/>
+                <a:ea typeface="+mn-ea"/>
+                <a:cs typeface="+mn-cs"/>
+              </a:rPr>
+              <a:t>Ruby</a:t>
+            </a:r>
+            <a:r>
+              <a:rPr lang="pt-BR" sz="1200" kern="1200" dirty="0" smtClean="0">
+                <a:solidFill>
+                  <a:schemeClr val="tx1"/>
+                </a:solidFill>
+                <a:effectLst/>
+                <a:latin typeface="+mn-lt"/>
+                <a:ea typeface="+mn-ea"/>
+                <a:cs typeface="+mn-cs"/>
+              </a:rPr>
+              <a:t> ou Python</a:t>
+            </a:r>
+            <a:r>
+              <a:rPr lang="pt-BR" sz="1200" b="1" kern="1200" dirty="0" smtClean="0">
+                <a:solidFill>
+                  <a:schemeClr val="tx1"/>
+                </a:solidFill>
+                <a:effectLst/>
+                <a:latin typeface="+mn-lt"/>
+                <a:ea typeface="+mn-ea"/>
+                <a:cs typeface="+mn-cs"/>
+              </a:rPr>
+              <a:t> </a:t>
+            </a:r>
+            <a:r>
+              <a:rPr lang="pt-BR" sz="1200" kern="1200" dirty="0" smtClean="0">
+                <a:solidFill>
+                  <a:schemeClr val="tx1"/>
+                </a:solidFill>
+                <a:effectLst/>
+                <a:latin typeface="+mn-lt"/>
+                <a:ea typeface="+mn-ea"/>
+                <a:cs typeface="+mn-cs"/>
+              </a:rPr>
+              <a:t>compartilham da mesma característica da </a:t>
+            </a:r>
+            <a:r>
+              <a:rPr lang="pt-BR" sz="1200" b="1" kern="1200" dirty="0" smtClean="0">
+                <a:solidFill>
+                  <a:schemeClr val="tx1"/>
+                </a:solidFill>
+                <a:effectLst/>
+                <a:latin typeface="+mn-lt"/>
+                <a:ea typeface="+mn-ea"/>
+                <a:cs typeface="+mn-cs"/>
+              </a:rPr>
+              <a:t>paralisação de processamento </a:t>
+            </a:r>
+            <a:r>
+              <a:rPr lang="pt-BR" sz="1200" kern="1200" dirty="0" smtClean="0">
+                <a:solidFill>
+                  <a:schemeClr val="tx1"/>
+                </a:solidFill>
+                <a:effectLst/>
+                <a:latin typeface="+mn-lt"/>
+                <a:ea typeface="+mn-ea"/>
+                <a:cs typeface="+mn-cs"/>
+              </a:rPr>
+              <a:t>enquanto utilizam um I/O no servidor. Input/Output – Entrada/Saída.</a:t>
+            </a:r>
+          </a:p>
+          <a:p>
+            <a:pPr marL="0" marR="0" indent="0" algn="l" defTabSz="914400" rtl="0" eaLnBrk="0" fontAlgn="base" latinLnBrk="0" hangingPunct="0">
+              <a:lnSpc>
+                <a:spcPct val="100000"/>
+              </a:lnSpc>
+              <a:spcBef>
+                <a:spcPct val="30000"/>
+              </a:spcBef>
+              <a:spcAft>
+                <a:spcPct val="0"/>
+              </a:spcAft>
+              <a:buClrTx/>
+              <a:buSzTx/>
+              <a:buFontTx/>
+              <a:buNone/>
+              <a:tabLst/>
+              <a:defRPr/>
+            </a:pPr>
+            <a:endParaRPr lang="pt-BR" sz="1200" kern="1200" dirty="0" smtClean="0">
+              <a:solidFill>
+                <a:schemeClr val="tx1"/>
+              </a:solidFill>
+              <a:effectLst/>
+              <a:latin typeface="+mn-lt"/>
+              <a:ea typeface="+mn-ea"/>
+              <a:cs typeface="+mn-cs"/>
+            </a:endParaRPr>
+          </a:p>
+          <a:p>
+            <a:pPr marL="0" marR="0" indent="0" algn="l" defTabSz="914400" rtl="0" eaLnBrk="0" fontAlgn="base" latinLnBrk="0" hangingPunct="0">
+              <a:lnSpc>
+                <a:spcPct val="100000"/>
+              </a:lnSpc>
+              <a:spcBef>
+                <a:spcPct val="30000"/>
+              </a:spcBef>
+              <a:spcAft>
+                <a:spcPct val="0"/>
+              </a:spcAft>
+              <a:buClrTx/>
+              <a:buSzTx/>
+              <a:buFontTx/>
+              <a:buNone/>
+              <a:tabLst/>
+              <a:defRPr/>
+            </a:pPr>
+            <a:r>
+              <a:rPr lang="pt-BR" sz="1200" kern="1200" dirty="0" smtClean="0">
+                <a:solidFill>
+                  <a:schemeClr val="tx1"/>
+                </a:solidFill>
+                <a:effectLst/>
+                <a:latin typeface="+mn-lt"/>
+                <a:ea typeface="+mn-ea"/>
+                <a:cs typeface="+mn-cs"/>
+              </a:rPr>
+              <a:t>Baseado neste problema que em 2009, Ryan Dahl e mais 14 colaboradores criaram o Node.js. O Node.js tem um modelo inovador, sendo sua arquitetura não-bloqueante (</a:t>
+            </a:r>
+            <a:r>
+              <a:rPr lang="pt-BR" sz="1200" i="1" kern="1200" dirty="0" smtClean="0">
+                <a:solidFill>
+                  <a:schemeClr val="tx1"/>
+                </a:solidFill>
+                <a:effectLst/>
+                <a:latin typeface="+mn-lt"/>
+                <a:ea typeface="+mn-ea"/>
+                <a:cs typeface="+mn-cs"/>
+              </a:rPr>
+              <a:t>non-</a:t>
+            </a:r>
+            <a:r>
+              <a:rPr lang="pt-BR" sz="1200" i="1" kern="1200" dirty="0" err="1" smtClean="0">
+                <a:solidFill>
+                  <a:schemeClr val="tx1"/>
+                </a:solidFill>
+                <a:effectLst/>
+                <a:latin typeface="+mn-lt"/>
+                <a:ea typeface="+mn-ea"/>
+                <a:cs typeface="+mn-cs"/>
+              </a:rPr>
+              <a:t>blocking</a:t>
+            </a:r>
+            <a:r>
+              <a:rPr lang="pt-BR" sz="1200" i="1" kern="1200" dirty="0" smtClean="0">
+                <a:solidFill>
+                  <a:schemeClr val="tx1"/>
+                </a:solidFill>
+                <a:effectLst/>
+                <a:latin typeface="+mn-lt"/>
+                <a:ea typeface="+mn-ea"/>
+                <a:cs typeface="+mn-cs"/>
+              </a:rPr>
+              <a:t> thread</a:t>
+            </a:r>
+            <a:r>
+              <a:rPr lang="pt-BR" sz="1200" kern="1200" dirty="0" smtClean="0">
+                <a:solidFill>
+                  <a:schemeClr val="tx1"/>
+                </a:solidFill>
+                <a:effectLst/>
+                <a:latin typeface="+mn-lt"/>
+                <a:ea typeface="+mn-ea"/>
+                <a:cs typeface="+mn-cs"/>
+              </a:rPr>
+              <a:t>), apresentando uma boa performance e baixo consumo de memória.</a:t>
+            </a:r>
+          </a:p>
+          <a:p>
+            <a:pPr marL="0" marR="0" indent="0" algn="l" defTabSz="914400" rtl="0" eaLnBrk="0" fontAlgn="base" latinLnBrk="0" hangingPunct="0">
+              <a:lnSpc>
+                <a:spcPct val="100000"/>
+              </a:lnSpc>
+              <a:spcBef>
+                <a:spcPct val="30000"/>
+              </a:spcBef>
+              <a:spcAft>
+                <a:spcPct val="0"/>
+              </a:spcAft>
+              <a:buClrTx/>
+              <a:buSzTx/>
+              <a:buFontTx/>
+              <a:buNone/>
+              <a:tabLst/>
+              <a:defRPr/>
+            </a:pPr>
+            <a:endParaRPr lang="pt-BR" sz="1200" kern="1200" dirty="0" smtClean="0">
+              <a:solidFill>
+                <a:schemeClr val="tx1"/>
+              </a:solidFill>
+              <a:effectLst/>
+              <a:latin typeface="+mn-lt"/>
+              <a:ea typeface="+mn-ea"/>
+              <a:cs typeface="+mn-cs"/>
+            </a:endParaRPr>
+          </a:p>
+          <a:p>
+            <a:pPr marL="0" marR="0" indent="0" algn="l" defTabSz="914400" rtl="0" eaLnBrk="0" fontAlgn="base" latinLnBrk="0" hangingPunct="0">
+              <a:lnSpc>
+                <a:spcPct val="100000"/>
+              </a:lnSpc>
+              <a:spcBef>
+                <a:spcPct val="30000"/>
+              </a:spcBef>
+              <a:spcAft>
+                <a:spcPct val="0"/>
+              </a:spcAft>
+              <a:buClrTx/>
+              <a:buSzTx/>
+              <a:buFontTx/>
+              <a:buNone/>
+              <a:tabLst/>
+              <a:defRPr/>
+            </a:pPr>
+            <a:endParaRPr lang="pt-BR" sz="1200" kern="1200" dirty="0" smtClean="0">
+              <a:solidFill>
+                <a:schemeClr val="tx1"/>
+              </a:solidFill>
+              <a:effectLst/>
+              <a:latin typeface="+mn-lt"/>
+              <a:ea typeface="+mn-ea"/>
+              <a:cs typeface="+mn-cs"/>
+            </a:endParaRPr>
+          </a:p>
+          <a:p>
+            <a:pPr marL="0" marR="0" indent="0" algn="l" defTabSz="914400" rtl="0" eaLnBrk="0" fontAlgn="base" latinLnBrk="0" hangingPunct="0">
+              <a:lnSpc>
+                <a:spcPct val="100000"/>
+              </a:lnSpc>
+              <a:spcBef>
+                <a:spcPct val="30000"/>
+              </a:spcBef>
+              <a:spcAft>
+                <a:spcPct val="0"/>
+              </a:spcAft>
+              <a:buClrTx/>
+              <a:buSzTx/>
+              <a:buFontTx/>
+              <a:buNone/>
+              <a:tabLst/>
+              <a:defRPr/>
+            </a:pPr>
+            <a:r>
+              <a:rPr lang="pt-BR" sz="1200" kern="1200" dirty="0" smtClean="0">
+                <a:solidFill>
+                  <a:schemeClr val="tx1"/>
+                </a:solidFill>
+                <a:effectLst/>
+                <a:latin typeface="+mn-lt"/>
+                <a:ea typeface="+mn-ea"/>
+                <a:cs typeface="+mn-cs"/>
+              </a:rPr>
+              <a:t>O </a:t>
+            </a:r>
+            <a:r>
+              <a:rPr lang="pt-BR" sz="1200" i="1" kern="1200" dirty="0" err="1" smtClean="0">
+                <a:solidFill>
+                  <a:schemeClr val="tx1"/>
+                </a:solidFill>
+                <a:effectLst/>
+                <a:latin typeface="+mn-lt"/>
+                <a:ea typeface="+mn-ea"/>
+                <a:cs typeface="+mn-cs"/>
+              </a:rPr>
+              <a:t>JavaScript</a:t>
+            </a:r>
+            <a:r>
+              <a:rPr lang="pt-BR" sz="1200" kern="1200" dirty="0" smtClean="0">
+                <a:solidFill>
+                  <a:schemeClr val="tx1"/>
+                </a:solidFill>
+                <a:effectLst/>
+                <a:latin typeface="+mn-lt"/>
+                <a:ea typeface="+mn-ea"/>
+                <a:cs typeface="+mn-cs"/>
+              </a:rPr>
+              <a:t> é a sua linguagem de programação. Isso se deu graças à </a:t>
+            </a:r>
+            <a:r>
+              <a:rPr lang="pt-BR" sz="1200" i="1" kern="1200" dirty="0" err="1" smtClean="0">
+                <a:solidFill>
+                  <a:schemeClr val="tx1"/>
+                </a:solidFill>
+                <a:effectLst/>
+                <a:latin typeface="+mn-lt"/>
+                <a:ea typeface="+mn-ea"/>
+                <a:cs typeface="+mn-cs"/>
+              </a:rPr>
+              <a:t>engine</a:t>
+            </a:r>
+            <a:r>
+              <a:rPr lang="pt-BR" sz="1200" kern="1200" dirty="0" smtClean="0">
+                <a:solidFill>
+                  <a:schemeClr val="tx1"/>
+                </a:solidFill>
+                <a:effectLst/>
+                <a:latin typeface="+mn-lt"/>
+                <a:ea typeface="+mn-ea"/>
+                <a:cs typeface="+mn-cs"/>
+              </a:rPr>
+              <a:t> </a:t>
+            </a:r>
+            <a:r>
+              <a:rPr lang="pt-BR" sz="1200" i="1" kern="1200" dirty="0" err="1" smtClean="0">
+                <a:solidFill>
+                  <a:schemeClr val="tx1"/>
+                </a:solidFill>
+                <a:effectLst/>
+                <a:latin typeface="+mn-lt"/>
+                <a:ea typeface="+mn-ea"/>
+                <a:cs typeface="+mn-cs"/>
+              </a:rPr>
+              <a:t>JavaScript</a:t>
+            </a:r>
+            <a:r>
+              <a:rPr lang="pt-BR" sz="1200" i="1" kern="1200" dirty="0" smtClean="0">
+                <a:solidFill>
+                  <a:schemeClr val="tx1"/>
+                </a:solidFill>
+                <a:effectLst/>
+                <a:latin typeface="+mn-lt"/>
+                <a:ea typeface="+mn-ea"/>
+                <a:cs typeface="+mn-cs"/>
+              </a:rPr>
+              <a:t> </a:t>
+            </a:r>
+            <a:r>
+              <a:rPr lang="pt-BR" sz="1200" kern="1200" dirty="0" smtClean="0">
+                <a:solidFill>
+                  <a:schemeClr val="tx1"/>
+                </a:solidFill>
+                <a:effectLst/>
+                <a:latin typeface="+mn-lt"/>
+                <a:ea typeface="+mn-ea"/>
+                <a:cs typeface="+mn-cs"/>
+              </a:rPr>
+              <a:t>V8, utilizada também no navegador Google </a:t>
+            </a:r>
+            <a:r>
+              <a:rPr lang="pt-BR" sz="1200" kern="1200" dirty="0" err="1" smtClean="0">
+                <a:solidFill>
+                  <a:schemeClr val="tx1"/>
+                </a:solidFill>
+                <a:effectLst/>
+                <a:latin typeface="+mn-lt"/>
+                <a:ea typeface="+mn-ea"/>
+                <a:cs typeface="+mn-cs"/>
+              </a:rPr>
+              <a:t>Chrome</a:t>
+            </a:r>
+            <a:r>
+              <a:rPr lang="pt-BR" sz="1200" kern="1200" smtClean="0">
+                <a:solidFill>
+                  <a:schemeClr val="tx1"/>
+                </a:solidFill>
+                <a:effectLst/>
+                <a:latin typeface="+mn-lt"/>
+                <a:ea typeface="+mn-ea"/>
+                <a:cs typeface="+mn-cs"/>
+              </a:rPr>
+              <a:t>.</a:t>
+            </a:r>
+          </a:p>
+          <a:p>
+            <a:pPr marL="0" marR="0" indent="0" algn="l" defTabSz="914400" rtl="0" eaLnBrk="0" fontAlgn="base" latinLnBrk="0" hangingPunct="0">
+              <a:lnSpc>
+                <a:spcPct val="100000"/>
+              </a:lnSpc>
+              <a:spcBef>
+                <a:spcPct val="30000"/>
+              </a:spcBef>
+              <a:spcAft>
+                <a:spcPct val="0"/>
+              </a:spcAft>
+              <a:buClrTx/>
+              <a:buSzTx/>
+              <a:buFontTx/>
+              <a:buNone/>
+              <a:tabLst/>
+              <a:defRPr/>
+            </a:pPr>
+            <a:endParaRPr lang="pt-BR" sz="1200" kern="1200" dirty="0" smtClean="0">
+              <a:solidFill>
+                <a:schemeClr val="tx1"/>
+              </a:solidFill>
+              <a:effectLst/>
+              <a:latin typeface="+mn-lt"/>
+              <a:ea typeface="+mn-ea"/>
+              <a:cs typeface="+mn-cs"/>
+            </a:endParaRPr>
+          </a:p>
+          <a:p>
+            <a:pPr marL="0" marR="0" indent="0" algn="l" defTabSz="914400" rtl="0" eaLnBrk="0" fontAlgn="base" latinLnBrk="0" hangingPunct="0">
+              <a:lnSpc>
+                <a:spcPct val="100000"/>
+              </a:lnSpc>
+              <a:spcBef>
+                <a:spcPct val="30000"/>
+              </a:spcBef>
+              <a:spcAft>
+                <a:spcPct val="0"/>
+              </a:spcAft>
+              <a:buClrTx/>
+              <a:buSzTx/>
+              <a:buFontTx/>
+              <a:buNone/>
+              <a:tabLst/>
+              <a:defRPr/>
+            </a:pPr>
+            <a:endParaRPr lang="pt-BR" sz="1200" kern="1200" dirty="0" smtClean="0">
+              <a:solidFill>
+                <a:schemeClr val="tx1"/>
+              </a:solidFill>
+              <a:effectLst/>
+              <a:latin typeface="+mn-lt"/>
+              <a:ea typeface="+mn-ea"/>
+              <a:cs typeface="+mn-cs"/>
+            </a:endParaRPr>
+          </a:p>
+          <a:p>
+            <a:endParaRPr lang="pt-BR" dirty="0"/>
+          </a:p>
+        </p:txBody>
+      </p:sp>
+      <p:sp>
+        <p:nvSpPr>
+          <p:cNvPr id="4" name="Espaço Reservado para Número de Slide 3"/>
+          <p:cNvSpPr>
+            <a:spLocks noGrp="1"/>
+          </p:cNvSpPr>
+          <p:nvPr>
+            <p:ph type="sldNum" sz="quarter" idx="10"/>
+          </p:nvPr>
+        </p:nvSpPr>
+        <p:spPr/>
+        <p:txBody>
+          <a:bodyPr/>
+          <a:lstStyle/>
+          <a:p>
+            <a:pPr>
+              <a:defRPr/>
+            </a:pPr>
+            <a:fld id="{668A7CBB-8257-47DA-A05C-7F8B3B29CA9C}" type="slidenum">
+              <a:rPr lang="pt-BR" smtClean="0"/>
+              <a:pPr>
+                <a:defRPr/>
+              </a:pPr>
+              <a:t>7</a:t>
+            </a:fld>
+            <a:endParaRPr lang="pt-BR"/>
+          </a:p>
+        </p:txBody>
+      </p:sp>
+    </p:spTree>
+    <p:extLst>
+      <p:ext uri="{BB962C8B-B14F-4D97-AF65-F5344CB8AC3E}">
+        <p14:creationId xmlns:p14="http://schemas.microsoft.com/office/powerpoint/2010/main" val="1120347809"/>
+      </p:ext>
+    </p:extLst>
+  </p:cSld>
+  <p:clrMapOvr>
+    <a:masterClrMapping/>
+  </p:clrMapOvr>
+</p:notes>
+</file>
+
+<file path=ppt/notesSlides/notesSlide4.xml><?xml version="1.0" encoding="utf-8"?>
+<p:notes xmlns:a="http://schemas.openxmlformats.org/drawingml/2006/main" xmlns:r="http://schemas.openxmlformats.org/officeDocument/2006/relationships" xmlns:p="http://schemas.openxmlformats.org/presentationml/2006/main">
+  <p:cSld>
+    <p:spTree>
+      <p:nvGrpSpPr>
+        <p:cNvPr id="1" name=""/>
+        <p:cNvGrpSpPr/>
+        <p:nvPr/>
+      </p:nvGrpSpPr>
+      <p:grpSpPr>
+        <a:xfrm>
+          <a:off x="0" y="0"/>
+          <a:ext cx="0" cy="0"/>
+          <a:chOff x="0" y="0"/>
+          <a:chExt cx="0" cy="0"/>
+        </a:xfrm>
+      </p:grpSpPr>
+      <p:sp>
+        <p:nvSpPr>
+          <p:cNvPr id="2" name="Espaço Reservado para Imagem de Slide 1"/>
+          <p:cNvSpPr>
+            <a:spLocks noGrp="1" noRot="1" noChangeAspect="1"/>
+          </p:cNvSpPr>
+          <p:nvPr>
+            <p:ph type="sldImg"/>
+          </p:nvPr>
+        </p:nvSpPr>
+        <p:spPr/>
+      </p:sp>
+      <p:sp>
+        <p:nvSpPr>
+          <p:cNvPr id="3" name="Espaço Reservado para Anotações 2"/>
+          <p:cNvSpPr>
+            <a:spLocks noGrp="1"/>
+          </p:cNvSpPr>
+          <p:nvPr>
+            <p:ph type="body" idx="1"/>
+          </p:nvPr>
+        </p:nvSpPr>
+        <p:spPr/>
+        <p:txBody>
+          <a:bodyPr/>
+          <a:lstStyle/>
+          <a:p>
+            <a:r>
+              <a:rPr lang="pt-BR" sz="1200" kern="1200" dirty="0" smtClean="0">
+                <a:solidFill>
+                  <a:schemeClr val="tx1"/>
+                </a:solidFill>
+                <a:effectLst/>
+                <a:latin typeface="+mn-lt"/>
+                <a:ea typeface="+mn-ea"/>
+                <a:cs typeface="+mn-cs"/>
+              </a:rPr>
+              <a:t>Livros e materiais relacionados com o tema</a:t>
+            </a:r>
+          </a:p>
+          <a:p>
+            <a:r>
+              <a:rPr lang="pt-BR" sz="1200" kern="1200" dirty="0" smtClean="0">
+                <a:solidFill>
+                  <a:schemeClr val="tx1"/>
+                </a:solidFill>
+                <a:effectLst/>
+                <a:latin typeface="+mn-lt"/>
+                <a:ea typeface="+mn-ea"/>
+                <a:cs typeface="+mn-cs"/>
+              </a:rPr>
+              <a:t>Trabalhos e artigos acadêmicos</a:t>
+            </a:r>
+          </a:p>
+          <a:p>
+            <a:r>
+              <a:rPr lang="pt-BR" sz="1200" kern="1200" dirty="0" smtClean="0">
+                <a:solidFill>
+                  <a:schemeClr val="tx1"/>
+                </a:solidFill>
+                <a:effectLst/>
+                <a:latin typeface="+mn-lt"/>
+                <a:ea typeface="+mn-ea"/>
+                <a:cs typeface="+mn-cs"/>
+              </a:rPr>
+              <a:t>Páginas da internet</a:t>
+            </a:r>
+          </a:p>
+          <a:p>
+            <a:r>
+              <a:rPr lang="pt-BR" sz="1200" kern="1200" dirty="0" smtClean="0">
+                <a:solidFill>
+                  <a:schemeClr val="tx1"/>
+                </a:solidFill>
+                <a:effectLst/>
+                <a:latin typeface="+mn-lt"/>
+                <a:ea typeface="+mn-ea"/>
+                <a:cs typeface="+mn-cs"/>
+              </a:rPr>
+              <a:t>Pesquisas Bibliográficas</a:t>
+            </a:r>
+          </a:p>
+          <a:p>
+            <a:r>
+              <a:rPr lang="pt-BR" sz="1200" kern="1200" dirty="0" smtClean="0">
+                <a:solidFill>
+                  <a:schemeClr val="tx1"/>
+                </a:solidFill>
+                <a:effectLst/>
+                <a:latin typeface="+mn-lt"/>
+                <a:ea typeface="+mn-ea"/>
+                <a:cs typeface="+mn-cs"/>
+              </a:rPr>
+              <a:t>Reuniões</a:t>
+            </a:r>
+            <a:r>
+              <a:rPr lang="pt-BR" sz="1200" kern="1200" baseline="0" dirty="0" smtClean="0">
+                <a:solidFill>
+                  <a:schemeClr val="tx1"/>
+                </a:solidFill>
+                <a:effectLst/>
+                <a:latin typeface="+mn-lt"/>
+                <a:ea typeface="+mn-ea"/>
+                <a:cs typeface="+mn-cs"/>
+              </a:rPr>
+              <a:t> com pessoas com conhecimentos relacionados ao tema.</a:t>
+            </a:r>
+            <a:endParaRPr lang="pt-BR" dirty="0"/>
+          </a:p>
+        </p:txBody>
+      </p:sp>
+      <p:sp>
+        <p:nvSpPr>
+          <p:cNvPr id="4" name="Espaço Reservado para Número de Slide 3"/>
+          <p:cNvSpPr>
+            <a:spLocks noGrp="1"/>
+          </p:cNvSpPr>
+          <p:nvPr>
+            <p:ph type="sldNum" sz="quarter" idx="10"/>
+          </p:nvPr>
+        </p:nvSpPr>
+        <p:spPr/>
+        <p:txBody>
+          <a:bodyPr/>
+          <a:lstStyle/>
+          <a:p>
+            <a:pPr>
+              <a:defRPr/>
+            </a:pPr>
+            <a:fld id="{668A7CBB-8257-47DA-A05C-7F8B3B29CA9C}" type="slidenum">
+              <a:rPr lang="pt-BR" smtClean="0"/>
+              <a:pPr>
+                <a:defRPr/>
+              </a:pPr>
+              <a:t>9</a:t>
+            </a:fld>
+            <a:endParaRPr lang="pt-BR"/>
+          </a:p>
+        </p:txBody>
+      </p:sp>
+    </p:spTree>
+    <p:extLst>
+      <p:ext uri="{BB962C8B-B14F-4D97-AF65-F5344CB8AC3E}">
+        <p14:creationId xmlns:p14="http://schemas.microsoft.com/office/powerpoint/2010/main" val="150478301"/>
+      </p:ext>
+    </p:extLst>
   </p:cSld>
   <p:clrMapOvr>
     <a:masterClrMapping/>
@@ -14405,7 +15318,7 @@
           <p:nvPr/>
         </p:nvPicPr>
         <p:blipFill>
-          <a:blip r:embed="rId2">
+          <a:blip r:embed="rId3">
             <a:extLst>
               <a:ext uri="{28A0092B-C50C-407E-A947-70E740481C1C}">
                 <a14:useLocalDpi xmlns:a14="http://schemas.microsoft.com/office/drawing/2010/main" val="0"/>
@@ -14906,7 +15819,7 @@
           <p:nvPr/>
         </p:nvPicPr>
         <p:blipFill>
-          <a:blip r:embed="rId2" cstate="print">
+          <a:blip r:embed="rId3" cstate="print">
             <a:extLst>
               <a:ext uri="{28A0092B-C50C-407E-A947-70E740481C1C}">
                 <a14:useLocalDpi xmlns:a14="http://schemas.microsoft.com/office/drawing/2010/main" val="0"/>
@@ -14947,7 +15860,7 @@
           <p:nvPr/>
         </p:nvPicPr>
         <p:blipFill>
-          <a:blip r:embed="rId3" cstate="print">
+          <a:blip r:embed="rId4" cstate="print">
             <a:extLst>
               <a:ext uri="{28A0092B-C50C-407E-A947-70E740481C1C}">
                 <a14:useLocalDpi xmlns:a14="http://schemas.microsoft.com/office/drawing/2010/main" val="0"/>
@@ -14988,7 +15901,7 @@
           <p:nvPr/>
         </p:nvPicPr>
         <p:blipFill>
-          <a:blip r:embed="rId4">
+          <a:blip r:embed="rId5">
             <a:extLst>
               <a:ext uri="{28A0092B-C50C-407E-A947-70E740481C1C}">
                 <a14:useLocalDpi xmlns:a14="http://schemas.microsoft.com/office/drawing/2010/main" val="0"/>
@@ -15503,7 +16416,7 @@
           <p:nvPr/>
         </p:nvPicPr>
         <p:blipFill>
-          <a:blip r:embed="rId2">
+          <a:blip r:embed="rId3">
             <a:extLst>
               <a:ext uri="{28A0092B-C50C-407E-A947-70E740481C1C}">
                 <a14:useLocalDpi xmlns:a14="http://schemas.microsoft.com/office/drawing/2010/main" val="0"/>
@@ -15544,7 +16457,7 @@
           <p:nvPr/>
         </p:nvPicPr>
         <p:blipFill>
-          <a:blip r:embed="rId3">
+          <a:blip r:embed="rId4">
             <a:extLst>
               <a:ext uri="{28A0092B-C50C-407E-A947-70E740481C1C}">
                 <a14:useLocalDpi xmlns:a14="http://schemas.microsoft.com/office/drawing/2010/main" val="0"/>
@@ -15585,7 +16498,7 @@
           <p:nvPr/>
         </p:nvPicPr>
         <p:blipFill>
-          <a:blip r:embed="rId4">
+          <a:blip r:embed="rId5">
             <a:extLst>
               <a:ext uri="{28A0092B-C50C-407E-A947-70E740481C1C}">
                 <a14:useLocalDpi xmlns:a14="http://schemas.microsoft.com/office/drawing/2010/main" val="0"/>

</xml_diff>